<commit_message>
diagram + SQL scrip CC-database
</commit_message>
<xml_diff>
--- a/Diagrammer/CC-Web_design/CC_Web_Vinduer.pptx
+++ b/Diagrammer/CC-Web_design/CC_Web_Vinduer.pptx
@@ -202,7 +202,7 @@
           <a:p>
             <a:fld id="{9B123F91-F4A3-4DE7-98F5-321C0B3DDF78}" type="datetimeFigureOut">
               <a:rPr lang="da-DK" smtClean="0"/>
-              <a:t>14-10-2021</a:t>
+              <a:t>28-10-2021</a:t>
             </a:fld>
             <a:endParaRPr lang="da-DK"/>
           </a:p>
@@ -711,7 +711,7 @@
           <a:p>
             <a:fld id="{283C4389-C94E-476A-A06A-DD68FB615506}" type="datetimeFigureOut">
               <a:rPr lang="da-DK" smtClean="0"/>
-              <a:t>14-10-2021</a:t>
+              <a:t>28-10-2021</a:t>
             </a:fld>
             <a:endParaRPr lang="da-DK"/>
           </a:p>
@@ -909,7 +909,7 @@
           <a:p>
             <a:fld id="{283C4389-C94E-476A-A06A-DD68FB615506}" type="datetimeFigureOut">
               <a:rPr lang="da-DK" smtClean="0"/>
-              <a:t>14-10-2021</a:t>
+              <a:t>28-10-2021</a:t>
             </a:fld>
             <a:endParaRPr lang="da-DK"/>
           </a:p>
@@ -1117,7 +1117,7 @@
           <a:p>
             <a:fld id="{283C4389-C94E-476A-A06A-DD68FB615506}" type="datetimeFigureOut">
               <a:rPr lang="da-DK" smtClean="0"/>
-              <a:t>14-10-2021</a:t>
+              <a:t>28-10-2021</a:t>
             </a:fld>
             <a:endParaRPr lang="da-DK"/>
           </a:p>
@@ -1315,7 +1315,7 @@
           <a:p>
             <a:fld id="{283C4389-C94E-476A-A06A-DD68FB615506}" type="datetimeFigureOut">
               <a:rPr lang="da-DK" smtClean="0"/>
-              <a:t>14-10-2021</a:t>
+              <a:t>28-10-2021</a:t>
             </a:fld>
             <a:endParaRPr lang="da-DK"/>
           </a:p>
@@ -1590,7 +1590,7 @@
           <a:p>
             <a:fld id="{283C4389-C94E-476A-A06A-DD68FB615506}" type="datetimeFigureOut">
               <a:rPr lang="da-DK" smtClean="0"/>
-              <a:t>14-10-2021</a:t>
+              <a:t>28-10-2021</a:t>
             </a:fld>
             <a:endParaRPr lang="da-DK"/>
           </a:p>
@@ -1855,7 +1855,7 @@
           <a:p>
             <a:fld id="{283C4389-C94E-476A-A06A-DD68FB615506}" type="datetimeFigureOut">
               <a:rPr lang="da-DK" smtClean="0"/>
-              <a:t>14-10-2021</a:t>
+              <a:t>28-10-2021</a:t>
             </a:fld>
             <a:endParaRPr lang="da-DK"/>
           </a:p>
@@ -2267,7 +2267,7 @@
           <a:p>
             <a:fld id="{283C4389-C94E-476A-A06A-DD68FB615506}" type="datetimeFigureOut">
               <a:rPr lang="da-DK" smtClean="0"/>
-              <a:t>14-10-2021</a:t>
+              <a:t>28-10-2021</a:t>
             </a:fld>
             <a:endParaRPr lang="da-DK"/>
           </a:p>
@@ -2408,7 +2408,7 @@
           <a:p>
             <a:fld id="{283C4389-C94E-476A-A06A-DD68FB615506}" type="datetimeFigureOut">
               <a:rPr lang="da-DK" smtClean="0"/>
-              <a:t>14-10-2021</a:t>
+              <a:t>28-10-2021</a:t>
             </a:fld>
             <a:endParaRPr lang="da-DK"/>
           </a:p>
@@ -2521,7 +2521,7 @@
           <a:p>
             <a:fld id="{283C4389-C94E-476A-A06A-DD68FB615506}" type="datetimeFigureOut">
               <a:rPr lang="da-DK" smtClean="0"/>
-              <a:t>14-10-2021</a:t>
+              <a:t>28-10-2021</a:t>
             </a:fld>
             <a:endParaRPr lang="da-DK"/>
           </a:p>
@@ -2832,7 +2832,7 @@
           <a:p>
             <a:fld id="{283C4389-C94E-476A-A06A-DD68FB615506}" type="datetimeFigureOut">
               <a:rPr lang="da-DK" smtClean="0"/>
-              <a:t>14-10-2021</a:t>
+              <a:t>28-10-2021</a:t>
             </a:fld>
             <a:endParaRPr lang="da-DK"/>
           </a:p>
@@ -3120,7 +3120,7 @@
           <a:p>
             <a:fld id="{283C4389-C94E-476A-A06A-DD68FB615506}" type="datetimeFigureOut">
               <a:rPr lang="da-DK" smtClean="0"/>
-              <a:t>14-10-2021</a:t>
+              <a:t>28-10-2021</a:t>
             </a:fld>
             <a:endParaRPr lang="da-DK"/>
           </a:p>
@@ -3361,7 +3361,7 @@
           <a:p>
             <a:fld id="{283C4389-C94E-476A-A06A-DD68FB615506}" type="datetimeFigureOut">
               <a:rPr lang="da-DK" smtClean="0"/>
-              <a:t>14-10-2021</a:t>
+              <a:t>28-10-2021</a:t>
             </a:fld>
             <a:endParaRPr lang="da-DK"/>
           </a:p>
@@ -4984,7 +4984,7 @@
                   </a:schemeClr>
                 </a:solidFill>
               </a:rPr>
-              <a:t>Hans</a:t>
+              <a:t>12345678</a:t>
             </a:r>
           </a:p>
         </p:txBody>
@@ -5054,7 +5054,7 @@
         <p:spPr>
           <a:xfrm>
             <a:off x="4717525" y="1759120"/>
-            <a:ext cx="775597" cy="307777"/>
+            <a:ext cx="1162498" cy="307777"/>
           </a:xfrm>
           <a:prstGeom prst="rect">
             <a:avLst/>
@@ -5069,7 +5069,7 @@
           <a:p>
             <a:r>
               <a:rPr lang="da-DK" sz="1400" dirty="0"/>
-              <a:t>Fornavn</a:t>
+              <a:t>CVR-nummer</a:t>
             </a:r>
           </a:p>
         </p:txBody>
@@ -5089,7 +5089,7 @@
         <p:spPr>
           <a:xfrm>
             <a:off x="4717525" y="2434028"/>
-            <a:ext cx="887487" cy="307777"/>
+            <a:ext cx="1483291" cy="307777"/>
           </a:xfrm>
           <a:prstGeom prst="rect">
             <a:avLst/>
@@ -5104,7 +5104,7 @@
           <a:p>
             <a:r>
               <a:rPr lang="da-DK" sz="1400" dirty="0"/>
-              <a:t>Efternavn</a:t>
+              <a:t>Virksomhedsnavn</a:t>
             </a:r>
           </a:p>
         </p:txBody>
@@ -5124,6 +5124,65 @@
         <p:spPr>
           <a:xfrm>
             <a:off x="4717525" y="2750521"/>
+            <a:ext cx="2963206" cy="279761"/>
+          </a:xfrm>
+          <a:prstGeom prst="rect">
+            <a:avLst/>
+          </a:prstGeom>
+        </p:spPr>
+        <p:style>
+          <a:lnRef idx="2">
+            <a:schemeClr val="dk1"/>
+          </a:lnRef>
+          <a:fillRef idx="1">
+            <a:schemeClr val="lt1"/>
+          </a:fillRef>
+          <a:effectRef idx="0">
+            <a:schemeClr val="dk1"/>
+          </a:effectRef>
+          <a:fontRef idx="minor">
+            <a:schemeClr val="dk1"/>
+          </a:fontRef>
+        </p:style>
+        <p:txBody>
+          <a:bodyPr rtlCol="0" anchor="ctr"/>
+          <a:lstStyle/>
+          <a:p>
+            <a:r>
+              <a:rPr lang="da-DK" i="1" dirty="0" err="1">
+                <a:solidFill>
+                  <a:schemeClr val="bg1">
+                    <a:lumMod val="65000"/>
+                  </a:schemeClr>
+                </a:solidFill>
+              </a:rPr>
+              <a:t>CityCrawl</a:t>
+            </a:r>
+            <a:endParaRPr lang="da-DK" i="1" dirty="0">
+              <a:solidFill>
+                <a:schemeClr val="bg1">
+                  <a:lumMod val="65000"/>
+                </a:schemeClr>
+              </a:solidFill>
+            </a:endParaRPr>
+          </a:p>
+        </p:txBody>
+      </p:sp>
+      <p:sp>
+        <p:nvSpPr>
+          <p:cNvPr id="13" name="Rektangel 12">
+            <a:extLst>
+              <a:ext uri="{FF2B5EF4-FFF2-40B4-BE49-F238E27FC236}">
+                <a16:creationId xmlns:a16="http://schemas.microsoft.com/office/drawing/2014/main" id="{93705218-B299-420B-9E58-060A73FFBE09}"/>
+              </a:ext>
+            </a:extLst>
+          </p:cNvPr>
+          <p:cNvSpPr/>
+          <p:nvPr/>
+        </p:nvSpPr>
+        <p:spPr>
+          <a:xfrm>
+            <a:off x="4717525" y="3367196"/>
             <a:ext cx="2963206" cy="279761"/>
           </a:xfrm>
           <a:prstGeom prst="rect">
@@ -5156,59 +5215,7 @@
                   </a:schemeClr>
                 </a:solidFill>
               </a:rPr>
-              <a:t>Hansen</a:t>
-            </a:r>
-          </a:p>
-        </p:txBody>
-      </p:sp>
-      <p:sp>
-        <p:nvSpPr>
-          <p:cNvPr id="13" name="Rektangel 12">
-            <a:extLst>
-              <a:ext uri="{FF2B5EF4-FFF2-40B4-BE49-F238E27FC236}">
-                <a16:creationId xmlns:a16="http://schemas.microsoft.com/office/drawing/2014/main" id="{93705218-B299-420B-9E58-060A73FFBE09}"/>
-              </a:ext>
-            </a:extLst>
-          </p:cNvPr>
-          <p:cNvSpPr/>
-          <p:nvPr/>
-        </p:nvSpPr>
-        <p:spPr>
-          <a:xfrm>
-            <a:off x="4717525" y="3367196"/>
-            <a:ext cx="2963206" cy="279761"/>
-          </a:xfrm>
-          <a:prstGeom prst="rect">
-            <a:avLst/>
-          </a:prstGeom>
-        </p:spPr>
-        <p:style>
-          <a:lnRef idx="2">
-            <a:schemeClr val="dk1"/>
-          </a:lnRef>
-          <a:fillRef idx="1">
-            <a:schemeClr val="lt1"/>
-          </a:fillRef>
-          <a:effectRef idx="0">
-            <a:schemeClr val="dk1"/>
-          </a:effectRef>
-          <a:fontRef idx="minor">
-            <a:schemeClr val="dk1"/>
-          </a:fontRef>
-        </p:style>
-        <p:txBody>
-          <a:bodyPr rtlCol="0" anchor="ctr"/>
-          <a:lstStyle/>
-          <a:p>
-            <a:r>
-              <a:rPr lang="da-DK" i="1" dirty="0">
-                <a:solidFill>
-                  <a:schemeClr val="bg1">
-                    <a:lumMod val="65000"/>
-                  </a:schemeClr>
-                </a:solidFill>
-              </a:rPr>
-              <a:t>DD-MM-YYYY</a:t>
+              <a:t>Hans Hansen</a:t>
             </a:r>
           </a:p>
         </p:txBody>
@@ -5228,7 +5235,7 @@
         <p:spPr>
           <a:xfrm>
             <a:off x="4698070" y="3114791"/>
-            <a:ext cx="1058880" cy="307777"/>
+            <a:ext cx="1292470" cy="307777"/>
           </a:xfrm>
           <a:prstGeom prst="rect">
             <a:avLst/>
@@ -5243,7 +5250,7 @@
           <a:p>
             <a:r>
               <a:rPr lang="da-DK" sz="1400" dirty="0"/>
-              <a:t>Fødselsdato</a:t>
+              <a:t>Kontakt person</a:t>
             </a:r>
           </a:p>
         </p:txBody>

</xml_diff>

<commit_message>
opdatering af pakke billeder til WPF og Web
</commit_message>
<xml_diff>
--- a/Diagrammer/CC-Web_design/CC_Web_Vinduer.pptx
+++ b/Diagrammer/CC-Web_design/CC_Web_Vinduer.pptx
@@ -5,7 +5,7 @@
     <p:sldMasterId id="2147483648" r:id="rId1"/>
   </p:sldMasterIdLst>
   <p:notesMasterIdLst>
-    <p:notesMasterId r:id="rId8"/>
+    <p:notesMasterId r:id="rId9"/>
   </p:notesMasterIdLst>
   <p:sldIdLst>
     <p:sldId id="256" r:id="rId2"/>
@@ -14,6 +14,7 @@
     <p:sldId id="269" r:id="rId5"/>
     <p:sldId id="259" r:id="rId6"/>
     <p:sldId id="266" r:id="rId7"/>
+    <p:sldId id="270" r:id="rId8"/>
   </p:sldIdLst>
   <p:sldSz cx="12192000" cy="6858000"/>
   <p:notesSz cx="6858000" cy="9144000"/>
@@ -202,7 +203,7 @@
           <a:p>
             <a:fld id="{9B123F91-F4A3-4DE7-98F5-321C0B3DDF78}" type="datetimeFigureOut">
               <a:rPr lang="da-DK" smtClean="0"/>
-              <a:t>28-10-2021</a:t>
+              <a:t>04-11-2021</a:t>
             </a:fld>
             <a:endParaRPr lang="da-DK"/>
           </a:p>
@@ -711,7 +712,7 @@
           <a:p>
             <a:fld id="{283C4389-C94E-476A-A06A-DD68FB615506}" type="datetimeFigureOut">
               <a:rPr lang="da-DK" smtClean="0"/>
-              <a:t>28-10-2021</a:t>
+              <a:t>04-11-2021</a:t>
             </a:fld>
             <a:endParaRPr lang="da-DK"/>
           </a:p>
@@ -909,7 +910,7 @@
           <a:p>
             <a:fld id="{283C4389-C94E-476A-A06A-DD68FB615506}" type="datetimeFigureOut">
               <a:rPr lang="da-DK" smtClean="0"/>
-              <a:t>28-10-2021</a:t>
+              <a:t>04-11-2021</a:t>
             </a:fld>
             <a:endParaRPr lang="da-DK"/>
           </a:p>
@@ -1117,7 +1118,7 @@
           <a:p>
             <a:fld id="{283C4389-C94E-476A-A06A-DD68FB615506}" type="datetimeFigureOut">
               <a:rPr lang="da-DK" smtClean="0"/>
-              <a:t>28-10-2021</a:t>
+              <a:t>04-11-2021</a:t>
             </a:fld>
             <a:endParaRPr lang="da-DK"/>
           </a:p>
@@ -1315,7 +1316,7 @@
           <a:p>
             <a:fld id="{283C4389-C94E-476A-A06A-DD68FB615506}" type="datetimeFigureOut">
               <a:rPr lang="da-DK" smtClean="0"/>
-              <a:t>28-10-2021</a:t>
+              <a:t>04-11-2021</a:t>
             </a:fld>
             <a:endParaRPr lang="da-DK"/>
           </a:p>
@@ -1590,7 +1591,7 @@
           <a:p>
             <a:fld id="{283C4389-C94E-476A-A06A-DD68FB615506}" type="datetimeFigureOut">
               <a:rPr lang="da-DK" smtClean="0"/>
-              <a:t>28-10-2021</a:t>
+              <a:t>04-11-2021</a:t>
             </a:fld>
             <a:endParaRPr lang="da-DK"/>
           </a:p>
@@ -1855,7 +1856,7 @@
           <a:p>
             <a:fld id="{283C4389-C94E-476A-A06A-DD68FB615506}" type="datetimeFigureOut">
               <a:rPr lang="da-DK" smtClean="0"/>
-              <a:t>28-10-2021</a:t>
+              <a:t>04-11-2021</a:t>
             </a:fld>
             <a:endParaRPr lang="da-DK"/>
           </a:p>
@@ -2267,7 +2268,7 @@
           <a:p>
             <a:fld id="{283C4389-C94E-476A-A06A-DD68FB615506}" type="datetimeFigureOut">
               <a:rPr lang="da-DK" smtClean="0"/>
-              <a:t>28-10-2021</a:t>
+              <a:t>04-11-2021</a:t>
             </a:fld>
             <a:endParaRPr lang="da-DK"/>
           </a:p>
@@ -2408,7 +2409,7 @@
           <a:p>
             <a:fld id="{283C4389-C94E-476A-A06A-DD68FB615506}" type="datetimeFigureOut">
               <a:rPr lang="da-DK" smtClean="0"/>
-              <a:t>28-10-2021</a:t>
+              <a:t>04-11-2021</a:t>
             </a:fld>
             <a:endParaRPr lang="da-DK"/>
           </a:p>
@@ -2521,7 +2522,7 @@
           <a:p>
             <a:fld id="{283C4389-C94E-476A-A06A-DD68FB615506}" type="datetimeFigureOut">
               <a:rPr lang="da-DK" smtClean="0"/>
-              <a:t>28-10-2021</a:t>
+              <a:t>04-11-2021</a:t>
             </a:fld>
             <a:endParaRPr lang="da-DK"/>
           </a:p>
@@ -2832,7 +2833,7 @@
           <a:p>
             <a:fld id="{283C4389-C94E-476A-A06A-DD68FB615506}" type="datetimeFigureOut">
               <a:rPr lang="da-DK" smtClean="0"/>
-              <a:t>28-10-2021</a:t>
+              <a:t>04-11-2021</a:t>
             </a:fld>
             <a:endParaRPr lang="da-DK"/>
           </a:p>
@@ -3120,7 +3121,7 @@
           <a:p>
             <a:fld id="{283C4389-C94E-476A-A06A-DD68FB615506}" type="datetimeFigureOut">
               <a:rPr lang="da-DK" smtClean="0"/>
-              <a:t>28-10-2021</a:t>
+              <a:t>04-11-2021</a:t>
             </a:fld>
             <a:endParaRPr lang="da-DK"/>
           </a:p>
@@ -3361,7 +3362,7 @@
           <a:p>
             <a:fld id="{283C4389-C94E-476A-A06A-DD68FB615506}" type="datetimeFigureOut">
               <a:rPr lang="da-DK" smtClean="0"/>
-              <a:t>28-10-2021</a:t>
+              <a:t>04-11-2021</a:t>
             </a:fld>
             <a:endParaRPr lang="da-DK"/>
           </a:p>
@@ -7465,6 +7466,540 @@
     <p:extLst>
       <p:ext uri="{BB962C8B-B14F-4D97-AF65-F5344CB8AC3E}">
         <p14:creationId xmlns:p14="http://schemas.microsoft.com/office/powerpoint/2010/main" val="17750073"/>
+      </p:ext>
+    </p:extLst>
+  </p:cSld>
+  <p:clrMapOvr>
+    <a:masterClrMapping/>
+  </p:clrMapOvr>
+</p:sld>
+</file>
+
+<file path=ppt/slides/slide7.xml><?xml version="1.0" encoding="utf-8"?>
+<p:sld xmlns:a="http://schemas.openxmlformats.org/drawingml/2006/main" xmlns:r="http://schemas.openxmlformats.org/officeDocument/2006/relationships" xmlns:p="http://schemas.openxmlformats.org/presentationml/2006/main">
+  <p:cSld>
+    <p:spTree>
+      <p:nvGrpSpPr>
+        <p:cNvPr id="1" name=""/>
+        <p:cNvGrpSpPr/>
+        <p:nvPr/>
+      </p:nvGrpSpPr>
+      <p:grpSpPr>
+        <a:xfrm>
+          <a:off x="0" y="0"/>
+          <a:ext cx="0" cy="0"/>
+          <a:chOff x="0" y="0"/>
+          <a:chExt cx="0" cy="0"/>
+        </a:xfrm>
+      </p:grpSpPr>
+      <p:sp>
+        <p:nvSpPr>
+          <p:cNvPr id="8" name="Rektangel 7">
+            <a:extLst>
+              <a:ext uri="{FF2B5EF4-FFF2-40B4-BE49-F238E27FC236}">
+                <a16:creationId xmlns:a16="http://schemas.microsoft.com/office/drawing/2014/main" id="{0BCF8323-E73E-44CC-A3CE-086720839B4F}"/>
+              </a:ext>
+            </a:extLst>
+          </p:cNvPr>
+          <p:cNvSpPr/>
+          <p:nvPr/>
+        </p:nvSpPr>
+        <p:spPr>
+          <a:xfrm>
+            <a:off x="5280718" y="2342081"/>
+            <a:ext cx="1776090" cy="2433814"/>
+          </a:xfrm>
+          <a:prstGeom prst="rect">
+            <a:avLst/>
+          </a:prstGeom>
+        </p:spPr>
+        <p:style>
+          <a:lnRef idx="2">
+            <a:schemeClr val="dk1"/>
+          </a:lnRef>
+          <a:fillRef idx="1">
+            <a:schemeClr val="lt1"/>
+          </a:fillRef>
+          <a:effectRef idx="0">
+            <a:schemeClr val="dk1"/>
+          </a:effectRef>
+          <a:fontRef idx="minor">
+            <a:schemeClr val="dk1"/>
+          </a:fontRef>
+        </p:style>
+        <p:txBody>
+          <a:bodyPr rtlCol="0" anchor="ctr"/>
+          <a:lstStyle/>
+          <a:p>
+            <a:pPr algn="ctr"/>
+            <a:endParaRPr lang="da-DK"/>
+          </a:p>
+        </p:txBody>
+      </p:sp>
+      <p:sp>
+        <p:nvSpPr>
+          <p:cNvPr id="9" name="Rektangel 8">
+            <a:extLst>
+              <a:ext uri="{FF2B5EF4-FFF2-40B4-BE49-F238E27FC236}">
+                <a16:creationId xmlns:a16="http://schemas.microsoft.com/office/drawing/2014/main" id="{BE9CEF46-9A1B-4B31-A676-C0CFAD5CAD0C}"/>
+              </a:ext>
+            </a:extLst>
+          </p:cNvPr>
+          <p:cNvSpPr/>
+          <p:nvPr/>
+        </p:nvSpPr>
+        <p:spPr>
+          <a:xfrm>
+            <a:off x="5280718" y="2351016"/>
+            <a:ext cx="1776090" cy="427175"/>
+          </a:xfrm>
+          <a:prstGeom prst="rect">
+            <a:avLst/>
+          </a:prstGeom>
+        </p:spPr>
+        <p:style>
+          <a:lnRef idx="2">
+            <a:schemeClr val="dk1"/>
+          </a:lnRef>
+          <a:fillRef idx="1">
+            <a:schemeClr val="lt1"/>
+          </a:fillRef>
+          <a:effectRef idx="0">
+            <a:schemeClr val="dk1"/>
+          </a:effectRef>
+          <a:fontRef idx="minor">
+            <a:schemeClr val="dk1"/>
+          </a:fontRef>
+        </p:style>
+        <p:txBody>
+          <a:bodyPr rtlCol="0" anchor="ctr"/>
+          <a:lstStyle/>
+          <a:p>
+            <a:pPr algn="ctr"/>
+            <a:r>
+              <a:rPr lang="da-DK" dirty="0"/>
+              <a:t>Pakke 1</a:t>
+            </a:r>
+          </a:p>
+        </p:txBody>
+      </p:sp>
+      <p:sp>
+        <p:nvSpPr>
+          <p:cNvPr id="10" name="Tekstfelt 9">
+            <a:extLst>
+              <a:ext uri="{FF2B5EF4-FFF2-40B4-BE49-F238E27FC236}">
+                <a16:creationId xmlns:a16="http://schemas.microsoft.com/office/drawing/2014/main" id="{3B847692-8FEB-4093-B519-C1932F0CDF3A}"/>
+              </a:ext>
+            </a:extLst>
+          </p:cNvPr>
+          <p:cNvSpPr txBox="1"/>
+          <p:nvPr/>
+        </p:nvSpPr>
+        <p:spPr>
+          <a:xfrm>
+            <a:off x="5836781" y="4406563"/>
+            <a:ext cx="663964" cy="369332"/>
+          </a:xfrm>
+          <a:prstGeom prst="rect">
+            <a:avLst/>
+          </a:prstGeom>
+          <a:noFill/>
+        </p:spPr>
+        <p:txBody>
+          <a:bodyPr wrap="none" rtlCol="0">
+            <a:spAutoFit/>
+          </a:bodyPr>
+          <a:lstStyle/>
+          <a:p>
+            <a:r>
+              <a:rPr lang="da-DK" dirty="0"/>
+              <a:t>149.-</a:t>
+            </a:r>
+          </a:p>
+        </p:txBody>
+      </p:sp>
+      <p:pic>
+        <p:nvPicPr>
+          <p:cNvPr id="11" name="Billede 10">
+            <a:extLst>
+              <a:ext uri="{FF2B5EF4-FFF2-40B4-BE49-F238E27FC236}">
+                <a16:creationId xmlns:a16="http://schemas.microsoft.com/office/drawing/2014/main" id="{83C88DD4-7BEE-4EFA-9743-7B7D0F6B24DE}"/>
+              </a:ext>
+            </a:extLst>
+          </p:cNvPr>
+          <p:cNvPicPr>
+            <a:picLocks noChangeAspect="1"/>
+          </p:cNvPicPr>
+          <p:nvPr/>
+        </p:nvPicPr>
+        <p:blipFill>
+          <a:blip r:embed="rId2">
+            <a:extLst>
+              <a:ext uri="{28A0092B-C50C-407E-A947-70E740481C1C}">
+                <a14:useLocalDpi xmlns:a14="http://schemas.microsoft.com/office/drawing/2010/main" val="0"/>
+              </a:ext>
+            </a:extLst>
+          </a:blip>
+          <a:stretch>
+            <a:fillRect/>
+          </a:stretch>
+        </p:blipFill>
+        <p:spPr>
+          <a:xfrm>
+            <a:off x="5366099" y="2923182"/>
+            <a:ext cx="627285" cy="872572"/>
+          </a:xfrm>
+          <a:prstGeom prst="rect">
+            <a:avLst/>
+          </a:prstGeom>
+        </p:spPr>
+      </p:pic>
+      <p:pic>
+        <p:nvPicPr>
+          <p:cNvPr id="12" name="Billede 11">
+            <a:extLst>
+              <a:ext uri="{FF2B5EF4-FFF2-40B4-BE49-F238E27FC236}">
+                <a16:creationId xmlns:a16="http://schemas.microsoft.com/office/drawing/2014/main" id="{CC0EB86F-0273-489D-8C1B-FF9AD8E36C08}"/>
+              </a:ext>
+            </a:extLst>
+          </p:cNvPr>
+          <p:cNvPicPr>
+            <a:picLocks noChangeAspect="1"/>
+          </p:cNvPicPr>
+          <p:nvPr/>
+        </p:nvPicPr>
+        <p:blipFill>
+          <a:blip r:embed="rId3">
+            <a:extLst>
+              <a:ext uri="{28A0092B-C50C-407E-A947-70E740481C1C}">
+                <a14:useLocalDpi xmlns:a14="http://schemas.microsoft.com/office/drawing/2010/main" val="0"/>
+              </a:ext>
+            </a:extLst>
+          </a:blip>
+          <a:stretch>
+            <a:fillRect/>
+          </a:stretch>
+        </p:blipFill>
+        <p:spPr>
+          <a:xfrm>
+            <a:off x="6224166" y="2923182"/>
+            <a:ext cx="601860" cy="605399"/>
+          </a:xfrm>
+          <a:prstGeom prst="rect">
+            <a:avLst/>
+          </a:prstGeom>
+        </p:spPr>
+      </p:pic>
+      <p:pic>
+        <p:nvPicPr>
+          <p:cNvPr id="13" name="Billede 12">
+            <a:extLst>
+              <a:ext uri="{FF2B5EF4-FFF2-40B4-BE49-F238E27FC236}">
+                <a16:creationId xmlns:a16="http://schemas.microsoft.com/office/drawing/2014/main" id="{9CA66972-9139-4962-8E3E-DA13E39958BD}"/>
+              </a:ext>
+            </a:extLst>
+          </p:cNvPr>
+          <p:cNvPicPr>
+            <a:picLocks noChangeAspect="1"/>
+          </p:cNvPicPr>
+          <p:nvPr/>
+        </p:nvPicPr>
+        <p:blipFill>
+          <a:blip r:embed="rId4">
+            <a:extLst>
+              <a:ext uri="{28A0092B-C50C-407E-A947-70E740481C1C}">
+                <a14:useLocalDpi xmlns:a14="http://schemas.microsoft.com/office/drawing/2010/main" val="0"/>
+              </a:ext>
+            </a:extLst>
+          </a:blip>
+          <a:stretch>
+            <a:fillRect/>
+          </a:stretch>
+        </p:blipFill>
+        <p:spPr>
+          <a:xfrm>
+            <a:off x="6115368" y="3709544"/>
+            <a:ext cx="704554" cy="598707"/>
+          </a:xfrm>
+          <a:prstGeom prst="rect">
+            <a:avLst/>
+          </a:prstGeom>
+        </p:spPr>
+      </p:pic>
+      <p:sp>
+        <p:nvSpPr>
+          <p:cNvPr id="14" name="Rektangel 13">
+            <a:extLst>
+              <a:ext uri="{FF2B5EF4-FFF2-40B4-BE49-F238E27FC236}">
+                <a16:creationId xmlns:a16="http://schemas.microsoft.com/office/drawing/2014/main" id="{5D7764FA-057C-42DF-AD52-EF5D267D65AD}"/>
+              </a:ext>
+            </a:extLst>
+          </p:cNvPr>
+          <p:cNvSpPr/>
+          <p:nvPr/>
+        </p:nvSpPr>
+        <p:spPr>
+          <a:xfrm>
+            <a:off x="7562135" y="2342081"/>
+            <a:ext cx="1776090" cy="2433814"/>
+          </a:xfrm>
+          <a:prstGeom prst="rect">
+            <a:avLst/>
+          </a:prstGeom>
+        </p:spPr>
+        <p:style>
+          <a:lnRef idx="2">
+            <a:schemeClr val="dk1"/>
+          </a:lnRef>
+          <a:fillRef idx="1">
+            <a:schemeClr val="lt1"/>
+          </a:fillRef>
+          <a:effectRef idx="0">
+            <a:schemeClr val="dk1"/>
+          </a:effectRef>
+          <a:fontRef idx="minor">
+            <a:schemeClr val="dk1"/>
+          </a:fontRef>
+        </p:style>
+        <p:txBody>
+          <a:bodyPr rtlCol="0" anchor="ctr"/>
+          <a:lstStyle/>
+          <a:p>
+            <a:pPr algn="ctr"/>
+            <a:endParaRPr lang="da-DK"/>
+          </a:p>
+        </p:txBody>
+      </p:sp>
+      <p:sp>
+        <p:nvSpPr>
+          <p:cNvPr id="15" name="Rektangel 14">
+            <a:extLst>
+              <a:ext uri="{FF2B5EF4-FFF2-40B4-BE49-F238E27FC236}">
+                <a16:creationId xmlns:a16="http://schemas.microsoft.com/office/drawing/2014/main" id="{D0267529-0928-41FB-A286-965366380DB6}"/>
+              </a:ext>
+            </a:extLst>
+          </p:cNvPr>
+          <p:cNvSpPr/>
+          <p:nvPr/>
+        </p:nvSpPr>
+        <p:spPr>
+          <a:xfrm>
+            <a:off x="7562135" y="2351016"/>
+            <a:ext cx="1776090" cy="427175"/>
+          </a:xfrm>
+          <a:prstGeom prst="rect">
+            <a:avLst/>
+          </a:prstGeom>
+        </p:spPr>
+        <p:style>
+          <a:lnRef idx="2">
+            <a:schemeClr val="dk1"/>
+          </a:lnRef>
+          <a:fillRef idx="1">
+            <a:schemeClr val="lt1"/>
+          </a:fillRef>
+          <a:effectRef idx="0">
+            <a:schemeClr val="dk1"/>
+          </a:effectRef>
+          <a:fontRef idx="minor">
+            <a:schemeClr val="dk1"/>
+          </a:fontRef>
+        </p:style>
+        <p:txBody>
+          <a:bodyPr rtlCol="0" anchor="ctr"/>
+          <a:lstStyle/>
+          <a:p>
+            <a:pPr algn="ctr"/>
+            <a:r>
+              <a:rPr lang="da-DK" dirty="0"/>
+              <a:t>Pakke 2</a:t>
+            </a:r>
+          </a:p>
+        </p:txBody>
+      </p:sp>
+      <p:sp>
+        <p:nvSpPr>
+          <p:cNvPr id="16" name="Tekstfelt 15">
+            <a:extLst>
+              <a:ext uri="{FF2B5EF4-FFF2-40B4-BE49-F238E27FC236}">
+                <a16:creationId xmlns:a16="http://schemas.microsoft.com/office/drawing/2014/main" id="{7B1E5542-A0D3-49C8-A451-EA08704F0580}"/>
+              </a:ext>
+            </a:extLst>
+          </p:cNvPr>
+          <p:cNvSpPr txBox="1"/>
+          <p:nvPr/>
+        </p:nvSpPr>
+        <p:spPr>
+          <a:xfrm>
+            <a:off x="8118196" y="4410433"/>
+            <a:ext cx="663964" cy="369332"/>
+          </a:xfrm>
+          <a:prstGeom prst="rect">
+            <a:avLst/>
+          </a:prstGeom>
+          <a:noFill/>
+        </p:spPr>
+        <p:txBody>
+          <a:bodyPr wrap="none" rtlCol="0">
+            <a:spAutoFit/>
+          </a:bodyPr>
+          <a:lstStyle/>
+          <a:p>
+            <a:r>
+              <a:rPr lang="da-DK" dirty="0"/>
+              <a:t>249.-</a:t>
+            </a:r>
+          </a:p>
+        </p:txBody>
+      </p:sp>
+      <p:pic>
+        <p:nvPicPr>
+          <p:cNvPr id="17" name="Billede 16">
+            <a:extLst>
+              <a:ext uri="{FF2B5EF4-FFF2-40B4-BE49-F238E27FC236}">
+                <a16:creationId xmlns:a16="http://schemas.microsoft.com/office/drawing/2014/main" id="{333B12FB-D362-43F4-8BFC-A7E6A2F11F29}"/>
+              </a:ext>
+            </a:extLst>
+          </p:cNvPr>
+          <p:cNvPicPr>
+            <a:picLocks noChangeAspect="1"/>
+          </p:cNvPicPr>
+          <p:nvPr/>
+        </p:nvPicPr>
+        <p:blipFill>
+          <a:blip r:embed="rId5">
+            <a:extLst>
+              <a:ext uri="{28A0092B-C50C-407E-A947-70E740481C1C}">
+                <a14:useLocalDpi xmlns:a14="http://schemas.microsoft.com/office/drawing/2010/main" val="0"/>
+              </a:ext>
+            </a:extLst>
+          </a:blip>
+          <a:stretch>
+            <a:fillRect/>
+          </a:stretch>
+        </p:blipFill>
+        <p:spPr>
+          <a:xfrm>
+            <a:off x="7675576" y="2941052"/>
+            <a:ext cx="613632" cy="509544"/>
+          </a:xfrm>
+          <a:prstGeom prst="rect">
+            <a:avLst/>
+          </a:prstGeom>
+        </p:spPr>
+      </p:pic>
+      <p:pic>
+        <p:nvPicPr>
+          <p:cNvPr id="18" name="Billede 17">
+            <a:extLst>
+              <a:ext uri="{FF2B5EF4-FFF2-40B4-BE49-F238E27FC236}">
+                <a16:creationId xmlns:a16="http://schemas.microsoft.com/office/drawing/2014/main" id="{8BCCC261-206D-4402-8DD9-DB5BDA6FE04B}"/>
+              </a:ext>
+            </a:extLst>
+          </p:cNvPr>
+          <p:cNvPicPr>
+            <a:picLocks noChangeAspect="1"/>
+          </p:cNvPicPr>
+          <p:nvPr/>
+        </p:nvPicPr>
+        <p:blipFill>
+          <a:blip r:embed="rId4">
+            <a:extLst>
+              <a:ext uri="{28A0092B-C50C-407E-A947-70E740481C1C}">
+                <a14:useLocalDpi xmlns:a14="http://schemas.microsoft.com/office/drawing/2010/main" val="0"/>
+              </a:ext>
+            </a:extLst>
+          </a:blip>
+          <a:stretch>
+            <a:fillRect/>
+          </a:stretch>
+        </p:blipFill>
+        <p:spPr>
+          <a:xfrm>
+            <a:off x="8402649" y="2907123"/>
+            <a:ext cx="704554" cy="598707"/>
+          </a:xfrm>
+          <a:prstGeom prst="rect">
+            <a:avLst/>
+          </a:prstGeom>
+        </p:spPr>
+      </p:pic>
+      <p:pic>
+        <p:nvPicPr>
+          <p:cNvPr id="19" name="Billede 18">
+            <a:extLst>
+              <a:ext uri="{FF2B5EF4-FFF2-40B4-BE49-F238E27FC236}">
+                <a16:creationId xmlns:a16="http://schemas.microsoft.com/office/drawing/2014/main" id="{4ED4132E-2BE2-48E6-87F6-98F44340CC1B}"/>
+              </a:ext>
+            </a:extLst>
+          </p:cNvPr>
+          <p:cNvPicPr>
+            <a:picLocks noChangeAspect="1"/>
+          </p:cNvPicPr>
+          <p:nvPr/>
+        </p:nvPicPr>
+        <p:blipFill>
+          <a:blip r:embed="rId2">
+            <a:extLst>
+              <a:ext uri="{28A0092B-C50C-407E-A947-70E740481C1C}">
+                <a14:useLocalDpi xmlns:a14="http://schemas.microsoft.com/office/drawing/2010/main" val="0"/>
+              </a:ext>
+            </a:extLst>
+          </a:blip>
+          <a:stretch>
+            <a:fillRect/>
+          </a:stretch>
+        </p:blipFill>
+        <p:spPr>
+          <a:xfrm>
+            <a:off x="7654572" y="3471504"/>
+            <a:ext cx="627285" cy="872572"/>
+          </a:xfrm>
+          <a:prstGeom prst="rect">
+            <a:avLst/>
+          </a:prstGeom>
+        </p:spPr>
+      </p:pic>
+      <p:pic>
+        <p:nvPicPr>
+          <p:cNvPr id="20" name="Billede 19">
+            <a:extLst>
+              <a:ext uri="{FF2B5EF4-FFF2-40B4-BE49-F238E27FC236}">
+                <a16:creationId xmlns:a16="http://schemas.microsoft.com/office/drawing/2014/main" id="{FB677E8D-BF5B-4886-A836-0C82CCC02F5B}"/>
+              </a:ext>
+            </a:extLst>
+          </p:cNvPr>
+          <p:cNvPicPr>
+            <a:picLocks noChangeAspect="1"/>
+          </p:cNvPicPr>
+          <p:nvPr/>
+        </p:nvPicPr>
+        <p:blipFill>
+          <a:blip r:embed="rId3">
+            <a:extLst>
+              <a:ext uri="{28A0092B-C50C-407E-A947-70E740481C1C}">
+                <a14:useLocalDpi xmlns:a14="http://schemas.microsoft.com/office/drawing/2010/main" val="0"/>
+              </a:ext>
+            </a:extLst>
+          </a:blip>
+          <a:stretch>
+            <a:fillRect/>
+          </a:stretch>
+        </p:blipFill>
+        <p:spPr>
+          <a:xfrm>
+            <a:off x="8453996" y="3623140"/>
+            <a:ext cx="601860" cy="605399"/>
+          </a:xfrm>
+          <a:prstGeom prst="rect">
+            <a:avLst/>
+          </a:prstGeom>
+        </p:spPr>
+      </p:pic>
+    </p:spTree>
+    <p:extLst>
+      <p:ext uri="{BB962C8B-B14F-4D97-AF65-F5344CB8AC3E}">
+        <p14:creationId xmlns:p14="http://schemas.microsoft.com/office/powerpoint/2010/main" val="1833151011"/>
       </p:ext>
     </p:extLst>
   </p:cSld>

</xml_diff>

<commit_message>
Opretteselse af virksomhedsprofil html
</commit_message>
<xml_diff>
--- a/Diagrammer/CC-Web_design/CC_Web_Vinduer.pptx
+++ b/Diagrammer/CC-Web_design/CC_Web_Vinduer.pptx
@@ -5756,45 +5756,64 @@
       </p:sp>
       <p:sp>
         <p:nvSpPr>
-          <p:cNvPr id="19" name="Tekstfelt 18">
-            <a:extLst>
-              <a:ext uri="{FF2B5EF4-FFF2-40B4-BE49-F238E27FC236}">
-                <a16:creationId xmlns:a16="http://schemas.microsoft.com/office/drawing/2014/main" id="{873C5E3D-C5CD-4439-AB1B-018B75A9246E}"/>
-              </a:ext>
-            </a:extLst>
-          </p:cNvPr>
-          <p:cNvSpPr txBox="1"/>
+          <p:cNvPr id="16" name="Rektangel 15">
+            <a:extLst>
+              <a:ext uri="{FF2B5EF4-FFF2-40B4-BE49-F238E27FC236}">
+                <a16:creationId xmlns:a16="http://schemas.microsoft.com/office/drawing/2014/main" id="{393999E0-E7E5-4E27-8FCF-02E0ABB6BF54}"/>
+              </a:ext>
+            </a:extLst>
+          </p:cNvPr>
+          <p:cNvSpPr/>
           <p:nvPr/>
         </p:nvSpPr>
         <p:spPr>
           <a:xfrm>
-            <a:off x="559747" y="895629"/>
-            <a:ext cx="619657" cy="307777"/>
+            <a:off x="80234" y="845648"/>
+            <a:ext cx="1718795" cy="391885"/>
           </a:xfrm>
           <a:prstGeom prst="rect">
             <a:avLst/>
           </a:prstGeom>
           <a:noFill/>
-        </p:spPr>
-        <p:txBody>
-          <a:bodyPr wrap="none" rtlCol="0">
-            <a:spAutoFit/>
-          </a:bodyPr>
-          <a:lstStyle/>
-          <a:p>
-            <a:r>
-              <a:rPr lang="da-DK" sz="1400" dirty="0"/>
-              <a:t>Log af</a:t>
-            </a:r>
-          </a:p>
-        </p:txBody>
-      </p:sp>
-      <p:sp>
-        <p:nvSpPr>
-          <p:cNvPr id="39" name="Tekstfelt 38">
-            <a:extLst>
-              <a:ext uri="{FF2B5EF4-FFF2-40B4-BE49-F238E27FC236}">
-                <a16:creationId xmlns:a16="http://schemas.microsoft.com/office/drawing/2014/main" id="{5822883F-62C5-4BB6-82BB-C302FDF1B38C}"/>
+          <a:ln w="9525" cap="flat" cmpd="sng" algn="ctr">
+            <a:solidFill>
+              <a:schemeClr val="dk1"/>
+            </a:solidFill>
+            <a:prstDash val="solid"/>
+            <a:round/>
+            <a:headEnd type="none" w="med" len="med"/>
+            <a:tailEnd type="none" w="med" len="med"/>
+          </a:ln>
+        </p:spPr>
+        <p:style>
+          <a:lnRef idx="0">
+            <a:scrgbClr r="0" g="0" b="0"/>
+          </a:lnRef>
+          <a:fillRef idx="0">
+            <a:scrgbClr r="0" g="0" b="0"/>
+          </a:fillRef>
+          <a:effectRef idx="0">
+            <a:scrgbClr r="0" g="0" b="0"/>
+          </a:effectRef>
+          <a:fontRef idx="minor">
+            <a:schemeClr val="dk1"/>
+          </a:fontRef>
+        </p:style>
+        <p:txBody>
+          <a:bodyPr rtlCol="0" anchor="ctr"/>
+          <a:lstStyle/>
+          <a:p>
+            <a:pPr algn="ctr"/>
+            <a:endParaRPr lang="da-DK"/>
+          </a:p>
+        </p:txBody>
+      </p:sp>
+      <p:sp>
+        <p:nvSpPr>
+          <p:cNvPr id="19" name="Tekstfelt 18">
+            <a:extLst>
+              <a:ext uri="{FF2B5EF4-FFF2-40B4-BE49-F238E27FC236}">
+                <a16:creationId xmlns:a16="http://schemas.microsoft.com/office/drawing/2014/main" id="{873C5E3D-C5CD-4439-AB1B-018B75A9246E}"/>
               </a:ext>
             </a:extLst>
           </p:cNvPr>
@@ -5803,8 +5822,8 @@
         </p:nvSpPr>
         <p:spPr>
           <a:xfrm>
-            <a:off x="2716187" y="1993228"/>
-            <a:ext cx="2292744" cy="2492990"/>
+            <a:off x="559747" y="895629"/>
+            <a:ext cx="619657" cy="307777"/>
           </a:xfrm>
           <a:prstGeom prst="rect">
             <a:avLst/>
@@ -5818,6 +5837,41 @@
           <a:lstStyle/>
           <a:p>
             <a:r>
+              <a:rPr lang="da-DK" sz="1400" dirty="0"/>
+              <a:t>Log af</a:t>
+            </a:r>
+          </a:p>
+        </p:txBody>
+      </p:sp>
+      <p:sp>
+        <p:nvSpPr>
+          <p:cNvPr id="39" name="Tekstfelt 38">
+            <a:extLst>
+              <a:ext uri="{FF2B5EF4-FFF2-40B4-BE49-F238E27FC236}">
+                <a16:creationId xmlns:a16="http://schemas.microsoft.com/office/drawing/2014/main" id="{5822883F-62C5-4BB6-82BB-C302FDF1B38C}"/>
+              </a:ext>
+            </a:extLst>
+          </p:cNvPr>
+          <p:cNvSpPr txBox="1"/>
+          <p:nvPr/>
+        </p:nvSpPr>
+        <p:spPr>
+          <a:xfrm>
+            <a:off x="2716187" y="1993228"/>
+            <a:ext cx="2292744" cy="2492990"/>
+          </a:xfrm>
+          <a:prstGeom prst="rect">
+            <a:avLst/>
+          </a:prstGeom>
+          <a:noFill/>
+        </p:spPr>
+        <p:txBody>
+          <a:bodyPr wrap="none" rtlCol="0">
+            <a:spAutoFit/>
+          </a:bodyPr>
+          <a:lstStyle/>
+          <a:p>
+            <a:r>
               <a:rPr lang="da-DK" sz="1600" b="1" dirty="0"/>
               <a:t>Virksomheds profil</a:t>
             </a:r>
@@ -5828,15 +5882,6 @@
           <a:p>
             <a:r>
               <a:rPr lang="da-DK" sz="1400" dirty="0"/>
-              <a:t>CVR-nummer: 12345678</a:t>
-            </a:r>
-          </a:p>
-          <a:p>
-            <a:endParaRPr lang="da-DK" sz="1400" dirty="0"/>
-          </a:p>
-          <a:p>
-            <a:r>
-              <a:rPr lang="da-DK" sz="1400" dirty="0"/>
               <a:t>Virksomhedsnavn: </a:t>
             </a:r>
             <a:r>
@@ -5844,6 +5889,15 @@
               <a:t>CityCrawl</a:t>
             </a:r>
             <a:endParaRPr lang="da-DK" sz="1400" dirty="0"/>
+          </a:p>
+          <a:p>
+            <a:endParaRPr lang="da-DK" sz="1400" dirty="0"/>
+          </a:p>
+          <a:p>
+            <a:r>
+              <a:rPr lang="da-DK" sz="1400" dirty="0"/>
+              <a:t>CVR-nummer: 12345678</a:t>
+            </a:r>
           </a:p>
           <a:p>
             <a:endParaRPr lang="da-DK" sz="1400" dirty="0"/>
@@ -5876,7 +5930,7 @@
           <a:p>
             <a:r>
               <a:rPr lang="da-DK" sz="1400" dirty="0"/>
-              <a:t>Virksomhedsbeskrivelse</a:t>
+              <a:t>Virksomhedsbeskrivelse:	 </a:t>
             </a:r>
           </a:p>
         </p:txBody>

</xml_diff>